<commit_message>
bug fix: define end/start pt based on y value
Signed-off-by: Mariana Avalos <mariana.avalos.arce@gmail.com>
</commit_message>
<xml_diff>
--- a/segment-intersection/res/tree-draw.pptx
+++ b/segment-intersection/res/tree-draw.pptx
@@ -5742,6 +5742,291 @@
           </p:style>
         </p:cxnSp>
       </p:grpSp>
+      <p:grpSp>
+        <p:nvGrpSpPr>
+          <p:cNvPr id="2" name="Group 1">
+            <a:extLst>
+              <a:ext uri="{FF2B5EF4-FFF2-40B4-BE49-F238E27FC236}">
+                <a16:creationId xmlns:a16="http://schemas.microsoft.com/office/drawing/2014/main" id="{901634CD-D125-4CD0-A281-0E1E3660E3C3}"/>
+              </a:ext>
+            </a:extLst>
+          </p:cNvPr>
+          <p:cNvGrpSpPr/>
+          <p:nvPr/>
+        </p:nvGrpSpPr>
+        <p:grpSpPr>
+          <a:xfrm>
+            <a:off x="4714647" y="2898598"/>
+            <a:ext cx="2638233" cy="1640064"/>
+            <a:chOff x="4714647" y="2898598"/>
+            <a:chExt cx="2638233" cy="1640064"/>
+          </a:xfrm>
+        </p:grpSpPr>
+        <p:sp>
+          <p:nvSpPr>
+            <p:cNvPr id="24" name="Oval 23">
+              <a:extLst>
+                <a:ext uri="{FF2B5EF4-FFF2-40B4-BE49-F238E27FC236}">
+                  <a16:creationId xmlns:a16="http://schemas.microsoft.com/office/drawing/2014/main" id="{0D95F9A4-A525-41F1-88A6-626C97894FFD}"/>
+                </a:ext>
+              </a:extLst>
+            </p:cNvPr>
+            <p:cNvSpPr/>
+            <p:nvPr/>
+          </p:nvSpPr>
+          <p:spPr>
+            <a:xfrm>
+              <a:off x="4714647" y="3718630"/>
+              <a:ext cx="879411" cy="820032"/>
+            </a:xfrm>
+            <a:prstGeom prst="ellipse">
+              <a:avLst/>
+            </a:prstGeom>
+          </p:spPr>
+          <p:style>
+            <a:lnRef idx="2">
+              <a:schemeClr val="dk1"/>
+            </a:lnRef>
+            <a:fillRef idx="1">
+              <a:schemeClr val="lt1"/>
+            </a:fillRef>
+            <a:effectRef idx="0">
+              <a:schemeClr val="dk1"/>
+            </a:effectRef>
+            <a:fontRef idx="minor">
+              <a:schemeClr val="dk1"/>
+            </a:fontRef>
+          </p:style>
+          <p:txBody>
+            <a:bodyPr rtlCol="0" anchor="ctr"/>
+            <a:lstStyle/>
+            <a:p>
+              <a:pPr algn="ctr"/>
+              <a:r>
+                <a:rPr lang="es-MX" sz="1200" dirty="0"/>
+                <a:t>10,6</a:t>
+              </a:r>
+            </a:p>
+            <a:p>
+              <a:pPr algn="ctr"/>
+              <a:r>
+                <a:rPr lang="es-MX" sz="1200" dirty="0"/>
+                <a:t>0</a:t>
+              </a:r>
+            </a:p>
+            <a:p>
+              <a:pPr algn="ctr"/>
+              <a:r>
+                <a:rPr lang="es-MX" sz="1200" dirty="0"/>
+                <a:t>True</a:t>
+              </a:r>
+              <a:endParaRPr lang="en-US" sz="1200" dirty="0"/>
+            </a:p>
+          </p:txBody>
+        </p:sp>
+        <p:sp>
+          <p:nvSpPr>
+            <p:cNvPr id="25" name="Oval 24">
+              <a:extLst>
+                <a:ext uri="{FF2B5EF4-FFF2-40B4-BE49-F238E27FC236}">
+                  <a16:creationId xmlns:a16="http://schemas.microsoft.com/office/drawing/2014/main" id="{4BA2FB27-49F1-46AF-810B-1AFBB0B9DB8C}"/>
+                </a:ext>
+              </a:extLst>
+            </p:cNvPr>
+            <p:cNvSpPr/>
+            <p:nvPr/>
+          </p:nvSpPr>
+          <p:spPr>
+            <a:xfrm>
+              <a:off x="5594058" y="2898598"/>
+              <a:ext cx="879411" cy="820032"/>
+            </a:xfrm>
+            <a:prstGeom prst="ellipse">
+              <a:avLst/>
+            </a:prstGeom>
+          </p:spPr>
+          <p:style>
+            <a:lnRef idx="2">
+              <a:schemeClr val="dk1"/>
+            </a:lnRef>
+            <a:fillRef idx="1">
+              <a:schemeClr val="lt1"/>
+            </a:fillRef>
+            <a:effectRef idx="0">
+              <a:schemeClr val="dk1"/>
+            </a:effectRef>
+            <a:fontRef idx="minor">
+              <a:schemeClr val="dk1"/>
+            </a:fontRef>
+          </p:style>
+          <p:txBody>
+            <a:bodyPr rtlCol="0" anchor="ctr"/>
+            <a:lstStyle/>
+            <a:p>
+              <a:pPr algn="ctr"/>
+              <a:r>
+                <a:rPr lang="es-MX" sz="1200" dirty="0"/>
+                <a:t>9,3</a:t>
+              </a:r>
+            </a:p>
+            <a:p>
+              <a:pPr algn="ctr"/>
+              <a:r>
+                <a:rPr lang="es-MX" sz="1200" dirty="0"/>
+                <a:t>1</a:t>
+              </a:r>
+            </a:p>
+            <a:p>
+              <a:pPr algn="ctr"/>
+              <a:r>
+                <a:rPr lang="es-MX" sz="1200" dirty="0"/>
+                <a:t>False</a:t>
+              </a:r>
+              <a:endParaRPr lang="en-US" sz="1200" dirty="0"/>
+            </a:p>
+          </p:txBody>
+        </p:sp>
+        <p:sp>
+          <p:nvSpPr>
+            <p:cNvPr id="26" name="Oval 25">
+              <a:extLst>
+                <a:ext uri="{FF2B5EF4-FFF2-40B4-BE49-F238E27FC236}">
+                  <a16:creationId xmlns:a16="http://schemas.microsoft.com/office/drawing/2014/main" id="{CA9A881C-FDAC-45E1-AAF9-45BC8EFFDFB8}"/>
+                </a:ext>
+              </a:extLst>
+            </p:cNvPr>
+            <p:cNvSpPr/>
+            <p:nvPr/>
+          </p:nvSpPr>
+          <p:spPr>
+            <a:xfrm>
+              <a:off x="6473469" y="3718630"/>
+              <a:ext cx="879411" cy="820032"/>
+            </a:xfrm>
+            <a:prstGeom prst="ellipse">
+              <a:avLst/>
+            </a:prstGeom>
+          </p:spPr>
+          <p:style>
+            <a:lnRef idx="2">
+              <a:schemeClr val="dk1"/>
+            </a:lnRef>
+            <a:fillRef idx="1">
+              <a:schemeClr val="lt1"/>
+            </a:fillRef>
+            <a:effectRef idx="0">
+              <a:schemeClr val="dk1"/>
+            </a:effectRef>
+            <a:fontRef idx="minor">
+              <a:schemeClr val="dk1"/>
+            </a:fontRef>
+          </p:style>
+          <p:txBody>
+            <a:bodyPr rtlCol="0" anchor="ctr"/>
+            <a:lstStyle/>
+            <a:p>
+              <a:pPr algn="ctr"/>
+              <a:r>
+                <a:rPr lang="es-MX" sz="1200" dirty="0"/>
+                <a:t>14,1</a:t>
+              </a:r>
+            </a:p>
+            <a:p>
+              <a:pPr algn="ctr"/>
+              <a:r>
+                <a:rPr lang="es-MX" sz="1200" dirty="0"/>
+                <a:t>1</a:t>
+              </a:r>
+            </a:p>
+            <a:p>
+              <a:pPr algn="ctr"/>
+              <a:r>
+                <a:rPr lang="es-MX" sz="1200" dirty="0"/>
+                <a:t>True</a:t>
+              </a:r>
+              <a:endParaRPr lang="en-US" sz="1200" dirty="0"/>
+            </a:p>
+          </p:txBody>
+        </p:sp>
+        <p:cxnSp>
+          <p:nvCxnSpPr>
+            <p:cNvPr id="28" name="Straight Connector 27">
+              <a:extLst>
+                <a:ext uri="{FF2B5EF4-FFF2-40B4-BE49-F238E27FC236}">
+                  <a16:creationId xmlns:a16="http://schemas.microsoft.com/office/drawing/2014/main" id="{18D995E6-ADC1-4963-9C33-0BA9E8261454}"/>
+                </a:ext>
+              </a:extLst>
+            </p:cNvPr>
+            <p:cNvCxnSpPr>
+              <a:cxnSpLocks/>
+              <a:endCxn id="24" idx="0"/>
+            </p:cNvCxnSpPr>
+            <p:nvPr/>
+          </p:nvCxnSpPr>
+          <p:spPr>
+            <a:xfrm flipH="1">
+              <a:off x="5154353" y="3598539"/>
+              <a:ext cx="568492" cy="120091"/>
+            </a:xfrm>
+            <a:prstGeom prst="line">
+              <a:avLst/>
+            </a:prstGeom>
+          </p:spPr>
+          <p:style>
+            <a:lnRef idx="1">
+              <a:schemeClr val="dk1"/>
+            </a:lnRef>
+            <a:fillRef idx="0">
+              <a:schemeClr val="dk1"/>
+            </a:fillRef>
+            <a:effectRef idx="0">
+              <a:schemeClr val="dk1"/>
+            </a:effectRef>
+            <a:fontRef idx="minor">
+              <a:schemeClr val="tx1"/>
+            </a:fontRef>
+          </p:style>
+        </p:cxnSp>
+        <p:cxnSp>
+          <p:nvCxnSpPr>
+            <p:cNvPr id="29" name="Straight Connector 28">
+              <a:extLst>
+                <a:ext uri="{FF2B5EF4-FFF2-40B4-BE49-F238E27FC236}">
+                  <a16:creationId xmlns:a16="http://schemas.microsoft.com/office/drawing/2014/main" id="{95F099B4-B773-4CF8-9C6E-BCAC72A234AD}"/>
+                </a:ext>
+              </a:extLst>
+            </p:cNvPr>
+            <p:cNvCxnSpPr>
+              <a:stCxn id="25" idx="5"/>
+              <a:endCxn id="26" idx="0"/>
+            </p:cNvCxnSpPr>
+            <p:nvPr/>
+          </p:nvCxnSpPr>
+          <p:spPr>
+            <a:xfrm>
+              <a:off x="6344682" y="3598539"/>
+              <a:ext cx="568493" cy="120091"/>
+            </a:xfrm>
+            <a:prstGeom prst="line">
+              <a:avLst/>
+            </a:prstGeom>
+          </p:spPr>
+          <p:style>
+            <a:lnRef idx="1">
+              <a:schemeClr val="dk1"/>
+            </a:lnRef>
+            <a:fillRef idx="0">
+              <a:schemeClr val="dk1"/>
+            </a:fillRef>
+            <a:effectRef idx="0">
+              <a:schemeClr val="dk1"/>
+            </a:effectRef>
+            <a:fontRef idx="minor">
+              <a:schemeClr val="tx1"/>
+            </a:fontRef>
+          </p:style>
+        </p:cxnSp>
+      </p:grpSp>
     </p:spTree>
     <p:extLst>
       <p:ext uri="{BB962C8B-B14F-4D97-AF65-F5344CB8AC3E}">

</xml_diff>

<commit_message>
isEnd to pos integer
Signed-off-by: Mariana Avalos <mariana.avalos.arce@gmail.com>
</commit_message>
<xml_diff>
--- a/segment-intersection/res/tree-draw.pptx
+++ b/segment-intersection/res/tree-draw.pptx
@@ -5432,7 +5432,7 @@
               <a:pPr algn="ctr"/>
               <a:r>
                 <a:rPr lang="es-MX" sz="1200" dirty="0"/>
-                <a:t>False</a:t>
+                <a:t>0</a:t>
               </a:r>
               <a:endParaRPr lang="en-US" sz="1200" dirty="0"/>
             </a:p>
@@ -5493,10 +5493,9 @@
             <a:p>
               <a:pPr algn="ctr"/>
               <a:r>
-                <a:rPr lang="es-MX" sz="1200" dirty="0"/>
-                <a:t>True</a:t>
+                <a:rPr lang="en-US" sz="1200" dirty="0"/>
+                <a:t>1</a:t>
               </a:r>
-              <a:endParaRPr lang="en-US" sz="1200" dirty="0"/>
             </a:p>
           </p:txBody>
         </p:sp>
@@ -5555,10 +5554,9 @@
             <a:p>
               <a:pPr algn="ctr"/>
               <a:r>
-                <a:rPr lang="es-MX" sz="1200" dirty="0"/>
-                <a:t>False</a:t>
+                <a:rPr lang="en-US" sz="1200" dirty="0"/>
+                <a:t>0</a:t>
               </a:r>
-              <a:endParaRPr lang="en-US" sz="1200" dirty="0"/>
             </a:p>
           </p:txBody>
         </p:sp>
@@ -5617,10 +5615,9 @@
             <a:p>
               <a:pPr algn="ctr"/>
               <a:r>
-                <a:rPr lang="es-MX" sz="1200" dirty="0"/>
-                <a:t>True</a:t>
+                <a:rPr lang="en-US" sz="1200" dirty="0"/>
+                <a:t>1</a:t>
               </a:r>
-              <a:endParaRPr lang="en-US" sz="1200" dirty="0"/>
             </a:p>
           </p:txBody>
         </p:sp>
@@ -5817,10 +5814,9 @@
             <a:p>
               <a:pPr algn="ctr"/>
               <a:r>
-                <a:rPr lang="es-MX" sz="1200" dirty="0"/>
-                <a:t>True</a:t>
+                <a:rPr lang="en-US" sz="1200" dirty="0"/>
+                <a:t>1</a:t>
               </a:r>
-              <a:endParaRPr lang="en-US" sz="1200" dirty="0"/>
             </a:p>
           </p:txBody>
         </p:sp>
@@ -5879,10 +5875,9 @@
             <a:p>
               <a:pPr algn="ctr"/>
               <a:r>
-                <a:rPr lang="es-MX" sz="1200" dirty="0"/>
-                <a:t>False</a:t>
+                <a:rPr lang="en-US" sz="1200" dirty="0"/>
+                <a:t>0</a:t>
               </a:r>
-              <a:endParaRPr lang="en-US" sz="1200" dirty="0"/>
             </a:p>
           </p:txBody>
         </p:sp>
@@ -5941,10 +5936,9 @@
             <a:p>
               <a:pPr algn="ctr"/>
               <a:r>
-                <a:rPr lang="es-MX" sz="1200" dirty="0"/>
-                <a:t>True</a:t>
+                <a:rPr lang="en-US" sz="1200" dirty="0"/>
+                <a:t>1</a:t>
               </a:r>
-              <a:endParaRPr lang="en-US" sz="1200" dirty="0"/>
             </a:p>
           </p:txBody>
         </p:sp>

</xml_diff>

<commit_message>
bug fix: t1 parameter and update readme with T
Signed-off-by: Mariana Avalos <mariana.avalos.arce@gmail.com>
</commit_message>
<xml_diff>
--- a/segment-intersection/res/tree-draw.pptx
+++ b/segment-intersection/res/tree-draw.pptx
@@ -260,7 +260,7 @@
           <a:p>
             <a:fld id="{E6E788F2-950F-4F2E-9770-EB3413EC90C2}" type="datetimeFigureOut">
               <a:rPr lang="en-US" smtClean="0"/>
-              <a:t>2/17/2021</a:t>
+              <a:t>2/18/2021</a:t>
             </a:fld>
             <a:endParaRPr lang="en-US"/>
           </a:p>
@@ -458,7 +458,7 @@
           <a:p>
             <a:fld id="{E6E788F2-950F-4F2E-9770-EB3413EC90C2}" type="datetimeFigureOut">
               <a:rPr lang="en-US" smtClean="0"/>
-              <a:t>2/17/2021</a:t>
+              <a:t>2/18/2021</a:t>
             </a:fld>
             <a:endParaRPr lang="en-US"/>
           </a:p>
@@ -666,7 +666,7 @@
           <a:p>
             <a:fld id="{E6E788F2-950F-4F2E-9770-EB3413EC90C2}" type="datetimeFigureOut">
               <a:rPr lang="en-US" smtClean="0"/>
-              <a:t>2/17/2021</a:t>
+              <a:t>2/18/2021</a:t>
             </a:fld>
             <a:endParaRPr lang="en-US"/>
           </a:p>
@@ -864,7 +864,7 @@
           <a:p>
             <a:fld id="{E6E788F2-950F-4F2E-9770-EB3413EC90C2}" type="datetimeFigureOut">
               <a:rPr lang="en-US" smtClean="0"/>
-              <a:t>2/17/2021</a:t>
+              <a:t>2/18/2021</a:t>
             </a:fld>
             <a:endParaRPr lang="en-US"/>
           </a:p>
@@ -1139,7 +1139,7 @@
           <a:p>
             <a:fld id="{E6E788F2-950F-4F2E-9770-EB3413EC90C2}" type="datetimeFigureOut">
               <a:rPr lang="en-US" smtClean="0"/>
-              <a:t>2/17/2021</a:t>
+              <a:t>2/18/2021</a:t>
             </a:fld>
             <a:endParaRPr lang="en-US"/>
           </a:p>
@@ -1404,7 +1404,7 @@
           <a:p>
             <a:fld id="{E6E788F2-950F-4F2E-9770-EB3413EC90C2}" type="datetimeFigureOut">
               <a:rPr lang="en-US" smtClean="0"/>
-              <a:t>2/17/2021</a:t>
+              <a:t>2/18/2021</a:t>
             </a:fld>
             <a:endParaRPr lang="en-US"/>
           </a:p>
@@ -1816,7 +1816,7 @@
           <a:p>
             <a:fld id="{E6E788F2-950F-4F2E-9770-EB3413EC90C2}" type="datetimeFigureOut">
               <a:rPr lang="en-US" smtClean="0"/>
-              <a:t>2/17/2021</a:t>
+              <a:t>2/18/2021</a:t>
             </a:fld>
             <a:endParaRPr lang="en-US"/>
           </a:p>
@@ -1957,7 +1957,7 @@
           <a:p>
             <a:fld id="{E6E788F2-950F-4F2E-9770-EB3413EC90C2}" type="datetimeFigureOut">
               <a:rPr lang="en-US" smtClean="0"/>
-              <a:t>2/17/2021</a:t>
+              <a:t>2/18/2021</a:t>
             </a:fld>
             <a:endParaRPr lang="en-US"/>
           </a:p>
@@ -2070,7 +2070,7 @@
           <a:p>
             <a:fld id="{E6E788F2-950F-4F2E-9770-EB3413EC90C2}" type="datetimeFigureOut">
               <a:rPr lang="en-US" smtClean="0"/>
-              <a:t>2/17/2021</a:t>
+              <a:t>2/18/2021</a:t>
             </a:fld>
             <a:endParaRPr lang="en-US"/>
           </a:p>
@@ -2381,7 +2381,7 @@
           <a:p>
             <a:fld id="{E6E788F2-950F-4F2E-9770-EB3413EC90C2}" type="datetimeFigureOut">
               <a:rPr lang="en-US" smtClean="0"/>
-              <a:t>2/17/2021</a:t>
+              <a:t>2/18/2021</a:t>
             </a:fld>
             <a:endParaRPr lang="en-US"/>
           </a:p>
@@ -2669,7 +2669,7 @@
           <a:p>
             <a:fld id="{E6E788F2-950F-4F2E-9770-EB3413EC90C2}" type="datetimeFigureOut">
               <a:rPr lang="en-US" smtClean="0"/>
-              <a:t>2/17/2021</a:t>
+              <a:t>2/18/2021</a:t>
             </a:fld>
             <a:endParaRPr lang="en-US"/>
           </a:p>
@@ -2910,7 +2910,7 @@
           <a:p>
             <a:fld id="{E6E788F2-950F-4F2E-9770-EB3413EC90C2}" type="datetimeFigureOut">
               <a:rPr lang="en-US" smtClean="0"/>
-              <a:t>2/17/2021</a:t>
+              <a:t>2/18/2021</a:t>
             </a:fld>
             <a:endParaRPr lang="en-US"/>
           </a:p>
@@ -6021,6 +6021,289 @@
           </p:style>
         </p:cxnSp>
       </p:grpSp>
+      <p:grpSp>
+        <p:nvGrpSpPr>
+          <p:cNvPr id="27" name="Group 26">
+            <a:extLst>
+              <a:ext uri="{FF2B5EF4-FFF2-40B4-BE49-F238E27FC236}">
+                <a16:creationId xmlns:a16="http://schemas.microsoft.com/office/drawing/2014/main" id="{BF45DDB7-589E-4526-B04D-EAF319D2A740}"/>
+              </a:ext>
+            </a:extLst>
+          </p:cNvPr>
+          <p:cNvGrpSpPr/>
+          <p:nvPr/>
+        </p:nvGrpSpPr>
+        <p:grpSpPr>
+          <a:xfrm>
+            <a:off x="692904" y="3202000"/>
+            <a:ext cx="2638233" cy="1640064"/>
+            <a:chOff x="4714647" y="2898598"/>
+            <a:chExt cx="2638233" cy="1640064"/>
+          </a:xfrm>
+        </p:grpSpPr>
+        <p:sp>
+          <p:nvSpPr>
+            <p:cNvPr id="30" name="Oval 29">
+              <a:extLst>
+                <a:ext uri="{FF2B5EF4-FFF2-40B4-BE49-F238E27FC236}">
+                  <a16:creationId xmlns:a16="http://schemas.microsoft.com/office/drawing/2014/main" id="{4E14CE8A-B805-4AAE-A141-5E84EF843515}"/>
+                </a:ext>
+              </a:extLst>
+            </p:cNvPr>
+            <p:cNvSpPr/>
+            <p:nvPr/>
+          </p:nvSpPr>
+          <p:spPr>
+            <a:xfrm>
+              <a:off x="4714647" y="3718630"/>
+              <a:ext cx="879411" cy="820032"/>
+            </a:xfrm>
+            <a:prstGeom prst="ellipse">
+              <a:avLst/>
+            </a:prstGeom>
+          </p:spPr>
+          <p:style>
+            <a:lnRef idx="2">
+              <a:schemeClr val="dk1"/>
+            </a:lnRef>
+            <a:fillRef idx="1">
+              <a:schemeClr val="lt1"/>
+            </a:fillRef>
+            <a:effectRef idx="0">
+              <a:schemeClr val="dk1"/>
+            </a:effectRef>
+            <a:fontRef idx="minor">
+              <a:schemeClr val="dk1"/>
+            </a:fontRef>
+          </p:style>
+          <p:txBody>
+            <a:bodyPr rtlCol="0" anchor="ctr"/>
+            <a:lstStyle/>
+            <a:p>
+              <a:pPr algn="ctr"/>
+              <a:r>
+                <a:rPr lang="es-MX" sz="1200" dirty="0"/>
+                <a:t>s3</a:t>
+              </a:r>
+            </a:p>
+            <a:p>
+              <a:pPr algn="ctr"/>
+              <a:r>
+                <a:rPr lang="es-MX" sz="1200" dirty="0"/>
+                <a:t>(1,1)</a:t>
+              </a:r>
+            </a:p>
+            <a:p>
+              <a:pPr algn="ctr"/>
+              <a:r>
+                <a:rPr lang="en-US" sz="1200" dirty="0"/>
+                <a:t>(-2,10)</a:t>
+              </a:r>
+            </a:p>
+          </p:txBody>
+        </p:sp>
+        <p:sp>
+          <p:nvSpPr>
+            <p:cNvPr id="31" name="Oval 30">
+              <a:extLst>
+                <a:ext uri="{FF2B5EF4-FFF2-40B4-BE49-F238E27FC236}">
+                  <a16:creationId xmlns:a16="http://schemas.microsoft.com/office/drawing/2014/main" id="{64F30CC5-1ED6-42B7-8A37-504F9D67F66D}"/>
+                </a:ext>
+              </a:extLst>
+            </p:cNvPr>
+            <p:cNvSpPr/>
+            <p:nvPr/>
+          </p:nvSpPr>
+          <p:spPr>
+            <a:xfrm>
+              <a:off x="5594058" y="2898598"/>
+              <a:ext cx="879411" cy="820032"/>
+            </a:xfrm>
+            <a:prstGeom prst="ellipse">
+              <a:avLst/>
+            </a:prstGeom>
+          </p:spPr>
+          <p:style>
+            <a:lnRef idx="2">
+              <a:schemeClr val="dk1"/>
+            </a:lnRef>
+            <a:fillRef idx="1">
+              <a:schemeClr val="lt1"/>
+            </a:fillRef>
+            <a:effectRef idx="0">
+              <a:schemeClr val="dk1"/>
+            </a:effectRef>
+            <a:fontRef idx="minor">
+              <a:schemeClr val="dk1"/>
+            </a:fontRef>
+          </p:style>
+          <p:txBody>
+            <a:bodyPr rtlCol="0" anchor="ctr"/>
+            <a:lstStyle/>
+            <a:p>
+              <a:pPr algn="ctr"/>
+              <a:r>
+                <a:rPr lang="es-MX" sz="1200" dirty="0"/>
+                <a:t>s1</a:t>
+              </a:r>
+            </a:p>
+            <a:p>
+              <a:pPr algn="ctr"/>
+              <a:r>
+                <a:rPr lang="en-US" sz="1200" dirty="0"/>
+                <a:t>(10,5)</a:t>
+              </a:r>
+            </a:p>
+            <a:p>
+              <a:pPr algn="ctr"/>
+              <a:r>
+                <a:rPr lang="en-US" sz="1200" dirty="0"/>
+                <a:t>(10,6)</a:t>
+              </a:r>
+              <a:endParaRPr lang="es-MX" sz="1200" dirty="0"/>
+            </a:p>
+          </p:txBody>
+        </p:sp>
+        <p:sp>
+          <p:nvSpPr>
+            <p:cNvPr id="32" name="Oval 31">
+              <a:extLst>
+                <a:ext uri="{FF2B5EF4-FFF2-40B4-BE49-F238E27FC236}">
+                  <a16:creationId xmlns:a16="http://schemas.microsoft.com/office/drawing/2014/main" id="{2B57D4D6-495D-459B-9865-50D386A23C29}"/>
+                </a:ext>
+              </a:extLst>
+            </p:cNvPr>
+            <p:cNvSpPr/>
+            <p:nvPr/>
+          </p:nvSpPr>
+          <p:spPr>
+            <a:xfrm>
+              <a:off x="6473469" y="3718630"/>
+              <a:ext cx="879411" cy="820032"/>
+            </a:xfrm>
+            <a:prstGeom prst="ellipse">
+              <a:avLst/>
+            </a:prstGeom>
+          </p:spPr>
+          <p:style>
+            <a:lnRef idx="2">
+              <a:schemeClr val="dk1"/>
+            </a:lnRef>
+            <a:fillRef idx="1">
+              <a:schemeClr val="lt1"/>
+            </a:fillRef>
+            <a:effectRef idx="0">
+              <a:schemeClr val="dk1"/>
+            </a:effectRef>
+            <a:fontRef idx="minor">
+              <a:schemeClr val="dk1"/>
+            </a:fontRef>
+          </p:style>
+          <p:txBody>
+            <a:bodyPr rtlCol="0" anchor="ctr"/>
+            <a:lstStyle/>
+            <a:p>
+              <a:pPr algn="ctr"/>
+              <a:r>
+                <a:rPr lang="es-MX" sz="1200" dirty="0"/>
+                <a:t>s2</a:t>
+              </a:r>
+            </a:p>
+            <a:p>
+              <a:pPr algn="ctr"/>
+              <a:r>
+                <a:rPr lang="es-MX" sz="1200" dirty="0"/>
+                <a:t>(-1,3)</a:t>
+              </a:r>
+            </a:p>
+            <a:p>
+              <a:pPr algn="ctr"/>
+              <a:r>
+                <a:rPr lang="en-US" sz="1200" dirty="0"/>
+                <a:t>(3,5)</a:t>
+              </a:r>
+            </a:p>
+          </p:txBody>
+        </p:sp>
+        <p:cxnSp>
+          <p:nvCxnSpPr>
+            <p:cNvPr id="33" name="Straight Connector 32">
+              <a:extLst>
+                <a:ext uri="{FF2B5EF4-FFF2-40B4-BE49-F238E27FC236}">
+                  <a16:creationId xmlns:a16="http://schemas.microsoft.com/office/drawing/2014/main" id="{A8F882E0-1048-47F3-872C-5A08C307764B}"/>
+                </a:ext>
+              </a:extLst>
+            </p:cNvPr>
+            <p:cNvCxnSpPr>
+              <a:cxnSpLocks/>
+              <a:endCxn id="30" idx="0"/>
+            </p:cNvCxnSpPr>
+            <p:nvPr/>
+          </p:nvCxnSpPr>
+          <p:spPr>
+            <a:xfrm flipH="1">
+              <a:off x="5154353" y="3598539"/>
+              <a:ext cx="568492" cy="120091"/>
+            </a:xfrm>
+            <a:prstGeom prst="line">
+              <a:avLst/>
+            </a:prstGeom>
+          </p:spPr>
+          <p:style>
+            <a:lnRef idx="1">
+              <a:schemeClr val="dk1"/>
+            </a:lnRef>
+            <a:fillRef idx="0">
+              <a:schemeClr val="dk1"/>
+            </a:fillRef>
+            <a:effectRef idx="0">
+              <a:schemeClr val="dk1"/>
+            </a:effectRef>
+            <a:fontRef idx="minor">
+              <a:schemeClr val="tx1"/>
+            </a:fontRef>
+          </p:style>
+        </p:cxnSp>
+        <p:cxnSp>
+          <p:nvCxnSpPr>
+            <p:cNvPr id="34" name="Straight Connector 33">
+              <a:extLst>
+                <a:ext uri="{FF2B5EF4-FFF2-40B4-BE49-F238E27FC236}">
+                  <a16:creationId xmlns:a16="http://schemas.microsoft.com/office/drawing/2014/main" id="{AC6B742B-C5FD-4E8F-A7CD-AF034AC82BC1}"/>
+                </a:ext>
+              </a:extLst>
+            </p:cNvPr>
+            <p:cNvCxnSpPr>
+              <a:stCxn id="31" idx="5"/>
+              <a:endCxn id="32" idx="0"/>
+            </p:cNvCxnSpPr>
+            <p:nvPr/>
+          </p:nvCxnSpPr>
+          <p:spPr>
+            <a:xfrm>
+              <a:off x="6344682" y="3598539"/>
+              <a:ext cx="568493" cy="120091"/>
+            </a:xfrm>
+            <a:prstGeom prst="line">
+              <a:avLst/>
+            </a:prstGeom>
+          </p:spPr>
+          <p:style>
+            <a:lnRef idx="1">
+              <a:schemeClr val="dk1"/>
+            </a:lnRef>
+            <a:fillRef idx="0">
+              <a:schemeClr val="dk1"/>
+            </a:fillRef>
+            <a:effectRef idx="0">
+              <a:schemeClr val="dk1"/>
+            </a:effectRef>
+            <a:fontRef idx="minor">
+              <a:schemeClr val="tx1"/>
+            </a:fontRef>
+          </p:style>
+        </p:cxnSp>
+      </p:grpSp>
     </p:spTree>
     <p:extLst>
       <p:ext uri="{BB962C8B-B14F-4D97-AF65-F5344CB8AC3E}">

</xml_diff>